<commit_message>
made code slide with a white background
</commit_message>
<xml_diff>
--- a/slides/C# Everywhere with Blazor.pptx
+++ b/slides/C# Everywhere with Blazor.pptx
@@ -12729,6 +12729,14 @@
 <file path=ppt/slides/slide23.xml><?xml version="1.0" encoding="utf-8"?>
 <p:sld xmlns:a="http://schemas.openxmlformats.org/drawingml/2006/main" xmlns:r="http://schemas.openxmlformats.org/officeDocument/2006/relationships" xmlns:p="http://schemas.openxmlformats.org/presentationml/2006/main">
   <p:cSld>
+    <p:bg>
+      <p:bgPr>
+        <a:solidFill>
+          <a:schemeClr val="bg1"/>
+        </a:solidFill>
+        <a:effectLst/>
+      </p:bgPr>
+    </p:bg>
     <p:spTree>
       <p:nvGrpSpPr>
         <p:cNvPr id="1" name=""/>

</xml_diff>